<commit_message>
Maj Diapo Revue 1
</commit_message>
<xml_diff>
--- a/oral_projet/diaporama_revue_1_samuel.pptx
+++ b/oral_projet/diaporama_revue_1_samuel.pptx
@@ -7287,7 +7287,7 @@
               <a:rPr lang="fr-FR" sz="2400" dirty="0">
                 <a:latin typeface="Berlin Sans FB" panose="020E0602020502020306" pitchFamily="34" charset="0"/>
               </a:rPr>
-              <a:t> et de la BDD : Collection des dernières mesure</a:t>
+              <a:t> et de la BDD : Collection des dernières mesures</a:t>
             </a:r>
           </a:p>
           <a:p>
@@ -7348,8 +7348,8 @@
         </p:nvSpPr>
         <p:spPr>
           <a:xfrm>
-            <a:off x="910332" y="3243229"/>
-            <a:ext cx="2358190" cy="1107995"/>
+            <a:off x="1082434" y="3210777"/>
+            <a:ext cx="6036724" cy="830997"/>
           </a:xfrm>
           <a:prstGeom prst="rect">
             <a:avLst/>
@@ -7362,7 +7362,64 @@
           </a:bodyPr>
           <a:lstStyle/>
           <a:p>
-            <a:endParaRPr lang="fr-FR" dirty="0"/>
+            <a:r>
+              <a:rPr lang="fr-FR" sz="2400" dirty="0">
+                <a:latin typeface="Berlin Sans FB" panose="020E0602020502020306" pitchFamily="34" charset="0"/>
+              </a:rPr>
+              <a:t>Mise en place page </a:t>
+            </a:r>
+            <a:r>
+              <a:rPr lang="fr-FR" sz="2400" dirty="0" err="1">
+                <a:latin typeface="Berlin Sans FB" panose="020E0602020502020306" pitchFamily="34" charset="0"/>
+              </a:rPr>
+              <a:t>php</a:t>
+            </a:r>
+            <a:r>
+              <a:rPr lang="fr-FR" sz="2400" dirty="0">
+                <a:latin typeface="Berlin Sans FB" panose="020E0602020502020306" pitchFamily="34" charset="0"/>
+              </a:rPr>
+              <a:t> : </a:t>
+            </a:r>
+          </a:p>
+          <a:p>
+            <a:r>
+              <a:rPr lang="fr-FR" sz="2400" dirty="0">
+                <a:latin typeface="Berlin Sans FB" panose="020E0602020502020306" pitchFamily="34" charset="0"/>
+              </a:rPr>
+              <a:t>Visualisation de l'état en temps réel de la serre</a:t>
+            </a:r>
+          </a:p>
+        </p:txBody>
+      </p:sp>
+      <p:sp>
+        <p:nvSpPr>
+          <p:cNvPr id="2" name="ZoneTexte 1">
+            <a:extLst>
+              <a:ext uri="{FF2B5EF4-FFF2-40B4-BE49-F238E27FC236}">
+                <a16:creationId xmlns:a16="http://schemas.microsoft.com/office/drawing/2014/main" id="{2BC33ED4-BDF7-41A6-B497-0BDE14EDC326}"/>
+              </a:ext>
+            </a:extLst>
+          </p:cNvPr>
+          <p:cNvSpPr txBox="1"/>
+          <p:nvPr/>
+        </p:nvSpPr>
+        <p:spPr>
+          <a:xfrm>
+            <a:off x="1208014" y="4345496"/>
+            <a:ext cx="4211273" cy="1015069"/>
+          </a:xfrm>
+          <a:prstGeom prst="rect">
+            <a:avLst/>
+          </a:prstGeom>
+          <a:noFill/>
+        </p:spPr>
+        <p:txBody>
+          <a:bodyPr wrap="square" rtlCol="0">
+            <a:spAutoFit/>
+          </a:bodyPr>
+          <a:lstStyle/>
+          <a:p>
+            <a:endParaRPr lang="fr-FR" sz="2400" dirty="0"/>
           </a:p>
         </p:txBody>
       </p:sp>

</xml_diff>

<commit_message>
Maj diapor revue 1
</commit_message>
<xml_diff>
--- a/oral_projet/diaporama_revue_1_samuel.pptx
+++ b/oral_projet/diaporama_revue_1_samuel.pptx
@@ -7258,7 +7258,7 @@
         <p:spPr>
           <a:xfrm>
             <a:off x="1082434" y="2323042"/>
-            <a:ext cx="5888270" cy="1107996"/>
+            <a:ext cx="5888270" cy="1046440"/>
           </a:xfrm>
           <a:prstGeom prst="rect">
             <a:avLst/>
@@ -7287,7 +7287,13 @@
               <a:rPr lang="fr-FR" sz="2400" dirty="0">
                 <a:latin typeface="Berlin Sans FB" panose="020E0602020502020306" pitchFamily="34" charset="0"/>
               </a:rPr>
-              <a:t> et de la BDD : Collection des dernières mesures</a:t>
+              <a:t> et de la BDD : </a:t>
+            </a:r>
+            <a:r>
+              <a:rPr lang="fr-FR" dirty="0">
+                <a:latin typeface="Berlin Sans FB" panose="020E0602020502020306" pitchFamily="34" charset="0"/>
+              </a:rPr>
+              <a:t>Collection des dernières mesures</a:t>
             </a:r>
           </a:p>
           <a:p>
@@ -7349,7 +7355,7 @@
         <p:spPr>
           <a:xfrm>
             <a:off x="1082434" y="3210777"/>
-            <a:ext cx="6036724" cy="830997"/>
+            <a:ext cx="6036724" cy="738664"/>
           </a:xfrm>
           <a:prstGeom prst="rect">
             <a:avLst/>
@@ -7383,7 +7389,7 @@
           </a:p>
           <a:p>
             <a:r>
-              <a:rPr lang="fr-FR" sz="2400" dirty="0">
+              <a:rPr lang="fr-FR" dirty="0">
                 <a:latin typeface="Berlin Sans FB" panose="020E0602020502020306" pitchFamily="34" charset="0"/>
               </a:rPr>
               <a:t>Visualisation de l'état en temps réel de la serre</a:t>
@@ -7405,8 +7411,8 @@
         </p:nvSpPr>
         <p:spPr>
           <a:xfrm>
-            <a:off x="1208014" y="4345496"/>
-            <a:ext cx="4211273" cy="1015069"/>
+            <a:off x="1082434" y="4041774"/>
+            <a:ext cx="7633727" cy="1569660"/>
           </a:xfrm>
           <a:prstGeom prst="rect">
             <a:avLst/>
@@ -7419,7 +7425,44 @@
           </a:bodyPr>
           <a:lstStyle/>
           <a:p>
-            <a:endParaRPr lang="fr-FR" sz="2400" dirty="0"/>
+            <a:r>
+              <a:rPr lang="fr-FR" sz="2400" dirty="0">
+                <a:latin typeface="Berlin Sans FB" panose="020E0602020502020306" pitchFamily="34" charset="0"/>
+              </a:rPr>
+              <a:t>Mise en place de la boucle 4-20 mA (avec Willy) :</a:t>
+            </a:r>
+          </a:p>
+          <a:p>
+            <a:r>
+              <a:rPr lang="fr-FR" dirty="0">
+                <a:latin typeface="Berlin Sans FB" panose="020E0602020502020306" pitchFamily="34" charset="0"/>
+              </a:rPr>
+              <a:t>Acquérir la mesure température sous serre</a:t>
+            </a:r>
+          </a:p>
+          <a:p>
+            <a:r>
+              <a:rPr lang="fr-FR" dirty="0">
+                <a:latin typeface="Berlin Sans FB" panose="020E0602020502020306" pitchFamily="34" charset="0"/>
+              </a:rPr>
+              <a:t>Acquérir la mesure température de l'eau des tuyaux de</a:t>
+            </a:r>
+          </a:p>
+          <a:p>
+            <a:r>
+              <a:rPr lang="fr-FR" dirty="0">
+                <a:latin typeface="Berlin Sans FB" panose="020E0602020502020306" pitchFamily="34" charset="0"/>
+              </a:rPr>
+              <a:t>Chauffage</a:t>
+            </a:r>
+          </a:p>
+          <a:p>
+            <a:r>
+              <a:rPr lang="fr-FR" dirty="0">
+                <a:latin typeface="Berlin Sans FB" panose="020E0602020502020306" pitchFamily="34" charset="0"/>
+              </a:rPr>
+              <a:t>Étalonnage des deux capteurs de température</a:t>
+            </a:r>
           </a:p>
         </p:txBody>
       </p:sp>

</xml_diff>

<commit_message>
Création diagramme séquence dans diapo
Co-Authored-By: drumz <drumz@users.noreply.github.com>
</commit_message>
<xml_diff>
--- a/oral_projet/diaporama_revue_1_samuel.pptx
+++ b/oral_projet/diaporama_revue_1_samuel.pptx
@@ -5,13 +5,15 @@
     <p:sldMasterId id="2147483648" r:id="rId1"/>
   </p:sldMasterIdLst>
   <p:notesMasterIdLst>
-    <p:notesMasterId r:id="rId6"/>
+    <p:notesMasterId r:id="rId8"/>
   </p:notesMasterIdLst>
   <p:sldIdLst>
     <p:sldId id="256" r:id="rId2"/>
     <p:sldId id="259" r:id="rId3"/>
     <p:sldId id="258" r:id="rId4"/>
     <p:sldId id="260" r:id="rId5"/>
+    <p:sldId id="262" r:id="rId6"/>
+    <p:sldId id="261" r:id="rId7"/>
   </p:sldIdLst>
   <p:sldSz cx="12192000" cy="6858000"/>
   <p:notesSz cx="6858000" cy="9144000"/>
@@ -204,7 +206,7 @@
           <a:p>
             <a:fld id="{7BEC4371-174F-4615-858D-8B61BA547698}" type="datetimeFigureOut">
               <a:rPr lang="fr-FR" smtClean="0"/>
-              <a:t>29/01/2018</a:t>
+              <a:t>06/02/2018</a:t>
             </a:fld>
             <a:endParaRPr lang="fr-FR"/>
           </a:p>
@@ -618,7 +620,7 @@
           <a:p>
             <a:fld id="{125942D7-A464-4365-815E-3C7EAFC3F152}" type="datetimeFigureOut">
               <a:rPr lang="fr-FR" smtClean="0"/>
-              <a:t>29/01/2018</a:t>
+              <a:t>06/02/2018</a:t>
             </a:fld>
             <a:endParaRPr lang="fr-FR"/>
           </a:p>
@@ -828,7 +830,7 @@
           <a:p>
             <a:fld id="{125942D7-A464-4365-815E-3C7EAFC3F152}" type="datetimeFigureOut">
               <a:rPr lang="fr-FR" smtClean="0"/>
-              <a:t>29/01/2018</a:t>
+              <a:t>06/02/2018</a:t>
             </a:fld>
             <a:endParaRPr lang="fr-FR"/>
           </a:p>
@@ -1048,7 +1050,7 @@
           <a:p>
             <a:fld id="{125942D7-A464-4365-815E-3C7EAFC3F152}" type="datetimeFigureOut">
               <a:rPr lang="fr-FR" smtClean="0"/>
-              <a:t>29/01/2018</a:t>
+              <a:t>06/02/2018</a:t>
             </a:fld>
             <a:endParaRPr lang="fr-FR"/>
           </a:p>
@@ -1258,7 +1260,7 @@
           <a:p>
             <a:fld id="{125942D7-A464-4365-815E-3C7EAFC3F152}" type="datetimeFigureOut">
               <a:rPr lang="fr-FR" smtClean="0"/>
-              <a:t>29/01/2018</a:t>
+              <a:t>06/02/2018</a:t>
             </a:fld>
             <a:endParaRPr lang="fr-FR"/>
           </a:p>
@@ -1545,7 +1547,7 @@
           <a:p>
             <a:fld id="{125942D7-A464-4365-815E-3C7EAFC3F152}" type="datetimeFigureOut">
               <a:rPr lang="fr-FR" smtClean="0"/>
-              <a:t>29/01/2018</a:t>
+              <a:t>06/02/2018</a:t>
             </a:fld>
             <a:endParaRPr lang="fr-FR"/>
           </a:p>
@@ -1822,7 +1824,7 @@
           <a:p>
             <a:fld id="{125942D7-A464-4365-815E-3C7EAFC3F152}" type="datetimeFigureOut">
               <a:rPr lang="fr-FR" smtClean="0"/>
-              <a:t>29/01/2018</a:t>
+              <a:t>06/02/2018</a:t>
             </a:fld>
             <a:endParaRPr lang="fr-FR"/>
           </a:p>
@@ -2246,7 +2248,7 @@
           <a:p>
             <a:fld id="{125942D7-A464-4365-815E-3C7EAFC3F152}" type="datetimeFigureOut">
               <a:rPr lang="fr-FR" smtClean="0"/>
-              <a:t>29/01/2018</a:t>
+              <a:t>06/02/2018</a:t>
             </a:fld>
             <a:endParaRPr lang="fr-FR"/>
           </a:p>
@@ -2399,7 +2401,7 @@
           <a:p>
             <a:fld id="{125942D7-A464-4365-815E-3C7EAFC3F152}" type="datetimeFigureOut">
               <a:rPr lang="fr-FR" smtClean="0"/>
-              <a:t>29/01/2018</a:t>
+              <a:t>06/02/2018</a:t>
             </a:fld>
             <a:endParaRPr lang="fr-FR"/>
           </a:p>
@@ -2524,7 +2526,7 @@
           <a:p>
             <a:fld id="{125942D7-A464-4365-815E-3C7EAFC3F152}" type="datetimeFigureOut">
               <a:rPr lang="fr-FR" smtClean="0"/>
-              <a:t>29/01/2018</a:t>
+              <a:t>06/02/2018</a:t>
             </a:fld>
             <a:endParaRPr lang="fr-FR"/>
           </a:p>
@@ -2847,7 +2849,7 @@
           <a:p>
             <a:fld id="{125942D7-A464-4365-815E-3C7EAFC3F152}" type="datetimeFigureOut">
               <a:rPr lang="fr-FR" smtClean="0"/>
-              <a:t>29/01/2018</a:t>
+              <a:t>06/02/2018</a:t>
             </a:fld>
             <a:endParaRPr lang="fr-FR"/>
           </a:p>
@@ -3147,7 +3149,7 @@
           <a:p>
             <a:fld id="{125942D7-A464-4365-815E-3C7EAFC3F152}" type="datetimeFigureOut">
               <a:rPr lang="fr-FR" smtClean="0"/>
-              <a:t>29/01/2018</a:t>
+              <a:t>06/02/2018</a:t>
             </a:fld>
             <a:endParaRPr lang="fr-FR"/>
           </a:p>
@@ -3400,7 +3402,7 @@
           <a:p>
             <a:fld id="{125942D7-A464-4365-815E-3C7EAFC3F152}" type="datetimeFigureOut">
               <a:rPr lang="fr-FR" smtClean="0"/>
-              <a:t>29/01/2018</a:t>
+              <a:t>06/02/2018</a:t>
             </a:fld>
             <a:endParaRPr lang="fr-FR"/>
           </a:p>
@@ -4454,7 +4456,7 @@
             <a:pPr algn="ctr"/>
             <a:r>
               <a:rPr lang="fr-FR" sz="1200" dirty="0"/>
-              <a:t>Mr ANGIBAUD</a:t>
+              <a:t>M ANGIBAUD</a:t>
             </a:r>
           </a:p>
           <a:p>
@@ -4510,14 +4512,14 @@
   <p:clrMapOvr>
     <a:masterClrMapping/>
   </p:clrMapOvr>
-  <mc:AlternateContent xmlns:mc="http://schemas.openxmlformats.org/markup-compatibility/2006" xmlns:p14="http://schemas.microsoft.com/office/powerpoint/2010/main">
-    <mc:Choice Requires="p14">
-      <p:transition spd="slow" advClick="0" advTm="1000">
+  <mc:AlternateContent xmlns:mc="http://schemas.openxmlformats.org/markup-compatibility/2006">
+    <mc:Choice xmlns:p14="http://schemas.microsoft.com/office/powerpoint/2010/main" Requires="p14">
+      <p:transition spd="slow">
         <p14:reveal/>
       </p:transition>
     </mc:Choice>
-    <mc:Fallback xmlns="">
-      <p:transition spd="slow" advClick="0" advTm="1000">
+    <mc:Fallback>
+      <p:transition spd="slow">
         <p:fade/>
       </p:transition>
     </mc:Fallback>
@@ -5310,7 +5312,7 @@
         </p:nvSpPr>
         <p:spPr>
           <a:xfrm>
-            <a:off x="2894202" y="1367406"/>
+            <a:off x="2912684" y="1271042"/>
             <a:ext cx="5632597" cy="769441"/>
           </a:xfrm>
           <a:prstGeom prst="rect">
@@ -5324,6 +5326,7 @@
           </a:bodyPr>
           <a:lstStyle/>
           <a:p>
+            <a:pPr algn="ctr"/>
             <a:r>
               <a:rPr lang="fr-FR" sz="4400" dirty="0">
                 <a:latin typeface="Berlin Sans FB" panose="020E0602020502020306" pitchFamily="34" charset="0"/>
@@ -5825,14 +5828,14 @@
   <p:clrMapOvr>
     <a:masterClrMapping/>
   </p:clrMapOvr>
-  <mc:AlternateContent xmlns:mc="http://schemas.openxmlformats.org/markup-compatibility/2006" xmlns:p14="http://schemas.microsoft.com/office/powerpoint/2010/main">
-    <mc:Choice Requires="p14">
-      <p:transition spd="slow" advClick="0" advTm="1000">
+  <mc:AlternateContent xmlns:mc="http://schemas.openxmlformats.org/markup-compatibility/2006">
+    <mc:Choice xmlns:p14="http://schemas.microsoft.com/office/powerpoint/2010/main" Requires="p14">
+      <p:transition spd="slow" p14:dur="3400">
         <p14:reveal/>
       </p:transition>
     </mc:Choice>
-    <mc:Fallback xmlns="">
-      <p:transition spd="slow" advClick="0" advTm="1000">
+    <mc:Fallback>
+      <p:transition spd="slow">
         <p:fade/>
       </p:transition>
     </mc:Fallback>
@@ -6285,7 +6288,7 @@
         </p:nvSpPr>
         <p:spPr>
           <a:xfrm>
-            <a:off x="3422708" y="1384184"/>
+            <a:off x="3279701" y="1237387"/>
             <a:ext cx="5632597" cy="769441"/>
           </a:xfrm>
           <a:prstGeom prst="rect">
@@ -6299,6 +6302,7 @@
           </a:bodyPr>
           <a:lstStyle/>
           <a:p>
+            <a:pPr algn="ctr"/>
             <a:r>
               <a:rPr lang="fr-FR" sz="4400" dirty="0">
                 <a:latin typeface="Berlin Sans FB" panose="020E0602020502020306" pitchFamily="34" charset="0"/>
@@ -6322,7 +6326,7 @@
         </p:nvSpPr>
         <p:spPr>
           <a:xfrm>
-            <a:off x="1156800" y="3143689"/>
+            <a:off x="1560804" y="2611929"/>
             <a:ext cx="2695434" cy="1754326"/>
           </a:xfrm>
           <a:prstGeom prst="rect">
@@ -6389,7 +6393,7 @@
         </p:blipFill>
         <p:spPr>
           <a:xfrm>
-            <a:off x="281031" y="2962470"/>
+            <a:off x="685035" y="2430710"/>
             <a:ext cx="914400" cy="914400"/>
           </a:xfrm>
           <a:prstGeom prst="rect">
@@ -6428,7 +6432,7 @@
         </p:blipFill>
         <p:spPr>
           <a:xfrm>
-            <a:off x="7822163" y="2962470"/>
+            <a:off x="8226167" y="2430710"/>
             <a:ext cx="914400" cy="914400"/>
           </a:xfrm>
           <a:prstGeom prst="rect">
@@ -6467,7 +6471,7 @@
         </p:blipFill>
         <p:spPr>
           <a:xfrm>
-            <a:off x="281031" y="5229808"/>
+            <a:off x="685035" y="4698048"/>
             <a:ext cx="914400" cy="914400"/>
           </a:xfrm>
           <a:prstGeom prst="rect">
@@ -6506,7 +6510,7 @@
         </p:blipFill>
         <p:spPr>
           <a:xfrm>
-            <a:off x="7999445" y="5229808"/>
+            <a:off x="8403449" y="4698048"/>
             <a:ext cx="914400" cy="914400"/>
           </a:xfrm>
           <a:prstGeom prst="rect">
@@ -6528,7 +6532,7 @@
         </p:nvSpPr>
         <p:spPr>
           <a:xfrm>
-            <a:off x="1151783" y="5363842"/>
+            <a:off x="1555787" y="4832082"/>
             <a:ext cx="2434177" cy="1200329"/>
           </a:xfrm>
           <a:prstGeom prst="rect">
@@ -6572,7 +6576,7 @@
         </p:nvSpPr>
         <p:spPr>
           <a:xfrm>
-            <a:off x="8736563" y="3107094"/>
+            <a:off x="9140567" y="2575334"/>
             <a:ext cx="2404188" cy="1754326"/>
           </a:xfrm>
           <a:prstGeom prst="rect">
@@ -6622,7 +6626,7 @@
         </p:nvSpPr>
         <p:spPr>
           <a:xfrm>
-            <a:off x="8736563" y="5339257"/>
+            <a:off x="9140567" y="4807497"/>
             <a:ext cx="2633906" cy="1200329"/>
           </a:xfrm>
           <a:prstGeom prst="rect">
@@ -6680,7 +6684,7 @@
         </p:blipFill>
         <p:spPr>
           <a:xfrm>
-            <a:off x="3156101" y="5441548"/>
+            <a:off x="3560105" y="4909788"/>
             <a:ext cx="885508" cy="885508"/>
           </a:xfrm>
           <a:prstGeom prst="rect">
@@ -6716,7 +6720,7 @@
         </p:blipFill>
         <p:spPr>
           <a:xfrm>
-            <a:off x="7355100" y="5491966"/>
+            <a:off x="7759104" y="4960206"/>
             <a:ext cx="715646" cy="715646"/>
           </a:xfrm>
           <a:prstGeom prst="rect">
@@ -6752,7 +6756,7 @@
         </p:blipFill>
         <p:spPr>
           <a:xfrm>
-            <a:off x="3311659" y="3254307"/>
+            <a:off x="3715663" y="2722547"/>
             <a:ext cx="729950" cy="729950"/>
           </a:xfrm>
           <a:prstGeom prst="rect">
@@ -6788,7 +6792,7 @@
         </p:blipFill>
         <p:spPr>
           <a:xfrm>
-            <a:off x="7106517" y="3143689"/>
+            <a:off x="7510521" y="2611929"/>
             <a:ext cx="715646" cy="715646"/>
           </a:xfrm>
           <a:prstGeom prst="rect">
@@ -7266,7 +7270,7 @@
         </p:nvSpPr>
         <p:spPr>
           <a:xfrm>
-            <a:off x="1082434" y="2382560"/>
+            <a:off x="1048878" y="2349004"/>
             <a:ext cx="5888270" cy="1046440"/>
           </a:xfrm>
           <a:prstGeom prst="rect">
@@ -7326,7 +7330,7 @@
         </p:nvSpPr>
         <p:spPr>
           <a:xfrm>
-            <a:off x="3852234" y="1187412"/>
+            <a:off x="2361082" y="1061143"/>
             <a:ext cx="7253761" cy="769441"/>
           </a:xfrm>
           <a:prstGeom prst="rect">
@@ -7340,6 +7344,7 @@
           </a:bodyPr>
           <a:lstStyle/>
           <a:p>
+            <a:pPr algn="ctr"/>
             <a:r>
               <a:rPr lang="fr-FR" sz="4400" dirty="0">
                 <a:latin typeface="Berlin Sans FB" panose="020E0602020502020306" pitchFamily="34" charset="0"/>
@@ -7363,7 +7368,7 @@
         </p:nvSpPr>
         <p:spPr>
           <a:xfrm>
-            <a:off x="1082434" y="3589111"/>
+            <a:off x="1048878" y="3555555"/>
             <a:ext cx="6036724" cy="738664"/>
           </a:xfrm>
           <a:prstGeom prst="rect">
@@ -7420,7 +7425,7 @@
         </p:nvSpPr>
         <p:spPr>
           <a:xfrm>
-            <a:off x="1082434" y="4977027"/>
+            <a:off x="1048878" y="4943471"/>
             <a:ext cx="7633727" cy="738664"/>
           </a:xfrm>
           <a:prstGeom prst="rect">
@@ -7473,7 +7478,7 @@
         </p:blipFill>
         <p:spPr>
           <a:xfrm>
-            <a:off x="8629810" y="2349255"/>
+            <a:off x="8596254" y="2315699"/>
             <a:ext cx="870001" cy="862629"/>
           </a:xfrm>
           <a:prstGeom prst="rect">
@@ -7509,7 +7514,7 @@
         </p:blipFill>
         <p:spPr>
           <a:xfrm>
-            <a:off x="9574805" y="2362447"/>
+            <a:off x="9541249" y="2328891"/>
             <a:ext cx="1296501" cy="863823"/>
           </a:xfrm>
           <a:prstGeom prst="rect">
@@ -7545,7 +7550,7 @@
         </p:blipFill>
         <p:spPr>
           <a:xfrm>
-            <a:off x="8730562" y="3445740"/>
+            <a:off x="8697006" y="3412184"/>
             <a:ext cx="1901046" cy="1026565"/>
           </a:xfrm>
           <a:prstGeom prst="rect">
@@ -7581,7 +7586,7 @@
         </p:blipFill>
         <p:spPr>
           <a:xfrm>
-            <a:off x="8073613" y="5040827"/>
+            <a:off x="8040057" y="5007271"/>
             <a:ext cx="862629" cy="862629"/>
           </a:xfrm>
           <a:prstGeom prst="rect">
@@ -7617,7 +7622,7 @@
         </p:blipFill>
         <p:spPr>
           <a:xfrm>
-            <a:off x="9208233" y="5053074"/>
+            <a:off x="9174677" y="5019518"/>
             <a:ext cx="850382" cy="850382"/>
           </a:xfrm>
           <a:prstGeom prst="rect">
@@ -7653,7 +7658,7 @@
         </p:blipFill>
         <p:spPr>
           <a:xfrm>
-            <a:off x="10255613" y="5057653"/>
+            <a:off x="10222057" y="5024097"/>
             <a:ext cx="850382" cy="850382"/>
           </a:xfrm>
           <a:prstGeom prst="rect">
@@ -7665,6 +7670,572 @@
     <p:extLst>
       <p:ext uri="{BB962C8B-B14F-4D97-AF65-F5344CB8AC3E}">
         <p14:creationId xmlns:p14="http://schemas.microsoft.com/office/powerpoint/2010/main" val="2149631933"/>
+      </p:ext>
+    </p:extLst>
+  </p:cSld>
+  <p:clrMapOvr>
+    <a:masterClrMapping/>
+  </p:clrMapOvr>
+  <mc:AlternateContent xmlns:mc="http://schemas.openxmlformats.org/markup-compatibility/2006">
+    <mc:Choice xmlns:p14="http://schemas.microsoft.com/office/powerpoint/2010/main" Requires="p14">
+      <p:transition spd="slow">
+        <p14:reveal/>
+      </p:transition>
+    </mc:Choice>
+    <mc:Fallback>
+      <p:transition spd="slow">
+        <p:fade/>
+      </p:transition>
+    </mc:Fallback>
+  </mc:AlternateContent>
+</p:sld>
+</file>
+
+<file path=ppt/slides/slide5.xml><?xml version="1.0" encoding="utf-8"?>
+<p:sld xmlns:a="http://schemas.openxmlformats.org/drawingml/2006/main" xmlns:r="http://schemas.openxmlformats.org/officeDocument/2006/relationships" xmlns:p="http://schemas.openxmlformats.org/presentationml/2006/main">
+  <p:cSld>
+    <p:spTree>
+      <p:nvGrpSpPr>
+        <p:cNvPr id="1" name=""/>
+        <p:cNvGrpSpPr/>
+        <p:nvPr/>
+      </p:nvGrpSpPr>
+      <p:grpSpPr>
+        <a:xfrm>
+          <a:off x="0" y="0"/>
+          <a:ext cx="0" cy="0"/>
+          <a:chOff x="0" y="0"/>
+          <a:chExt cx="0" cy="0"/>
+        </a:xfrm>
+      </p:grpSpPr>
+      <p:pic>
+        <p:nvPicPr>
+          <p:cNvPr id="8" name="Image 7">
+            <a:extLst>
+              <a:ext uri="{FF2B5EF4-FFF2-40B4-BE49-F238E27FC236}">
+                <a16:creationId xmlns:a16="http://schemas.microsoft.com/office/drawing/2014/main" id="{2BB825C5-31DA-4A56-85EA-536DBF510A31}"/>
+              </a:ext>
+            </a:extLst>
+          </p:cNvPr>
+          <p:cNvPicPr>
+            <a:picLocks noChangeAspect="1"/>
+          </p:cNvPicPr>
+          <p:nvPr/>
+        </p:nvPicPr>
+        <p:blipFill>
+          <a:blip r:embed="rId2">
+            <a:extLst>
+              <a:ext uri="{28A0092B-C50C-407E-A947-70E740481C1C}">
+                <a14:useLocalDpi xmlns:a14="http://schemas.microsoft.com/office/drawing/2010/main" val="0"/>
+              </a:ext>
+            </a:extLst>
+          </a:blip>
+          <a:stretch>
+            <a:fillRect/>
+          </a:stretch>
+        </p:blipFill>
+        <p:spPr>
+          <a:xfrm>
+            <a:off x="1068751" y="66457"/>
+            <a:ext cx="1259497" cy="776690"/>
+          </a:xfrm>
+          <a:prstGeom prst="rect">
+            <a:avLst/>
+          </a:prstGeom>
+        </p:spPr>
+      </p:pic>
+      <p:pic>
+        <p:nvPicPr>
+          <p:cNvPr id="10" name="Image 9">
+            <a:extLst>
+              <a:ext uri="{FF2B5EF4-FFF2-40B4-BE49-F238E27FC236}">
+                <a16:creationId xmlns:a16="http://schemas.microsoft.com/office/drawing/2014/main" id="{8EE7436F-49F2-41E0-93E4-D247B4705294}"/>
+              </a:ext>
+            </a:extLst>
+          </p:cNvPr>
+          <p:cNvPicPr>
+            <a:picLocks noChangeAspect="1"/>
+          </p:cNvPicPr>
+          <p:nvPr/>
+        </p:nvPicPr>
+        <p:blipFill>
+          <a:blip r:embed="rId3">
+            <a:extLst>
+              <a:ext uri="{28A0092B-C50C-407E-A947-70E740481C1C}">
+                <a14:useLocalDpi xmlns:a14="http://schemas.microsoft.com/office/drawing/2010/main" val="0"/>
+              </a:ext>
+            </a:extLst>
+          </a:blip>
+          <a:stretch>
+            <a:fillRect/>
+          </a:stretch>
+        </p:blipFill>
+        <p:spPr>
+          <a:xfrm>
+            <a:off x="9681085" y="238153"/>
+            <a:ext cx="1802101" cy="569807"/>
+          </a:xfrm>
+          <a:prstGeom prst="rect">
+            <a:avLst/>
+          </a:prstGeom>
+        </p:spPr>
+      </p:pic>
+      <p:cxnSp>
+        <p:nvCxnSpPr>
+          <p:cNvPr id="16" name="Connecteur droit 15">
+            <a:extLst>
+              <a:ext uri="{FF2B5EF4-FFF2-40B4-BE49-F238E27FC236}">
+                <a16:creationId xmlns:a16="http://schemas.microsoft.com/office/drawing/2014/main" id="{7319284A-BD6F-4A96-8E2B-E0A4B52E53C6}"/>
+              </a:ext>
+            </a:extLst>
+          </p:cNvPr>
+          <p:cNvCxnSpPr>
+            <a:cxnSpLocks/>
+          </p:cNvCxnSpPr>
+          <p:nvPr/>
+        </p:nvCxnSpPr>
+        <p:spPr>
+          <a:xfrm flipV="1">
+            <a:off x="0" y="454803"/>
+            <a:ext cx="738231" cy="1798"/>
+          </a:xfrm>
+          <a:prstGeom prst="line">
+            <a:avLst/>
+          </a:prstGeom>
+        </p:spPr>
+        <p:style>
+          <a:lnRef idx="3">
+            <a:schemeClr val="dk1"/>
+          </a:lnRef>
+          <a:fillRef idx="0">
+            <a:schemeClr val="dk1"/>
+          </a:fillRef>
+          <a:effectRef idx="2">
+            <a:schemeClr val="dk1"/>
+          </a:effectRef>
+          <a:fontRef idx="minor">
+            <a:schemeClr val="tx1"/>
+          </a:fontRef>
+        </p:style>
+      </p:cxnSp>
+      <p:cxnSp>
+        <p:nvCxnSpPr>
+          <p:cNvPr id="20" name="Connecteur droit 19">
+            <a:extLst>
+              <a:ext uri="{FF2B5EF4-FFF2-40B4-BE49-F238E27FC236}">
+                <a16:creationId xmlns:a16="http://schemas.microsoft.com/office/drawing/2014/main" id="{08874CF7-F149-4C81-B61E-74E18342BA8A}"/>
+              </a:ext>
+            </a:extLst>
+          </p:cNvPr>
+          <p:cNvCxnSpPr>
+            <a:cxnSpLocks/>
+          </p:cNvCxnSpPr>
+          <p:nvPr/>
+        </p:nvCxnSpPr>
+        <p:spPr>
+          <a:xfrm>
+            <a:off x="2573222" y="454803"/>
+            <a:ext cx="6829482" cy="10398"/>
+          </a:xfrm>
+          <a:prstGeom prst="line">
+            <a:avLst/>
+          </a:prstGeom>
+        </p:spPr>
+        <p:style>
+          <a:lnRef idx="3">
+            <a:schemeClr val="dk1"/>
+          </a:lnRef>
+          <a:fillRef idx="0">
+            <a:schemeClr val="dk1"/>
+          </a:fillRef>
+          <a:effectRef idx="2">
+            <a:schemeClr val="dk1"/>
+          </a:effectRef>
+          <a:fontRef idx="minor">
+            <a:schemeClr val="tx1"/>
+          </a:fontRef>
+        </p:style>
+      </p:cxnSp>
+      <p:cxnSp>
+        <p:nvCxnSpPr>
+          <p:cNvPr id="26" name="Connecteur droit 25">
+            <a:extLst>
+              <a:ext uri="{FF2B5EF4-FFF2-40B4-BE49-F238E27FC236}">
+                <a16:creationId xmlns:a16="http://schemas.microsoft.com/office/drawing/2014/main" id="{BB3B35CC-057B-48C1-880F-3306A6559175}"/>
+              </a:ext>
+            </a:extLst>
+          </p:cNvPr>
+          <p:cNvCxnSpPr>
+            <a:cxnSpLocks/>
+          </p:cNvCxnSpPr>
+          <p:nvPr/>
+        </p:nvCxnSpPr>
+        <p:spPr>
+          <a:xfrm>
+            <a:off x="738231" y="454803"/>
+            <a:ext cx="344203" cy="484764"/>
+          </a:xfrm>
+          <a:prstGeom prst="line">
+            <a:avLst/>
+          </a:prstGeom>
+        </p:spPr>
+        <p:style>
+          <a:lnRef idx="3">
+            <a:schemeClr val="dk1"/>
+          </a:lnRef>
+          <a:fillRef idx="0">
+            <a:schemeClr val="dk1"/>
+          </a:fillRef>
+          <a:effectRef idx="2">
+            <a:schemeClr val="dk1"/>
+          </a:effectRef>
+          <a:fontRef idx="minor">
+            <a:schemeClr val="tx1"/>
+          </a:fontRef>
+        </p:style>
+      </p:cxnSp>
+      <p:cxnSp>
+        <p:nvCxnSpPr>
+          <p:cNvPr id="32" name="Connecteur droit 31">
+            <a:extLst>
+              <a:ext uri="{FF2B5EF4-FFF2-40B4-BE49-F238E27FC236}">
+                <a16:creationId xmlns:a16="http://schemas.microsoft.com/office/drawing/2014/main" id="{4AD96496-1EB6-4E48-9BB2-5C255495C686}"/>
+              </a:ext>
+            </a:extLst>
+          </p:cNvPr>
+          <p:cNvCxnSpPr>
+            <a:cxnSpLocks/>
+          </p:cNvCxnSpPr>
+          <p:nvPr/>
+        </p:nvCxnSpPr>
+        <p:spPr>
+          <a:xfrm>
+            <a:off x="1082434" y="938268"/>
+            <a:ext cx="1146585" cy="0"/>
+          </a:xfrm>
+          <a:prstGeom prst="line">
+            <a:avLst/>
+          </a:prstGeom>
+        </p:spPr>
+        <p:style>
+          <a:lnRef idx="3">
+            <a:schemeClr val="dk1"/>
+          </a:lnRef>
+          <a:fillRef idx="0">
+            <a:schemeClr val="dk1"/>
+          </a:fillRef>
+          <a:effectRef idx="2">
+            <a:schemeClr val="dk1"/>
+          </a:effectRef>
+          <a:fontRef idx="minor">
+            <a:schemeClr val="tx1"/>
+          </a:fontRef>
+        </p:style>
+      </p:cxnSp>
+      <p:cxnSp>
+        <p:nvCxnSpPr>
+          <p:cNvPr id="51" name="Connecteur droit 50">
+            <a:extLst>
+              <a:ext uri="{FF2B5EF4-FFF2-40B4-BE49-F238E27FC236}">
+                <a16:creationId xmlns:a16="http://schemas.microsoft.com/office/drawing/2014/main" id="{C035BFA6-ECBF-4775-BA81-19D2CA41AA8D}"/>
+              </a:ext>
+            </a:extLst>
+          </p:cNvPr>
+          <p:cNvCxnSpPr>
+            <a:cxnSpLocks/>
+          </p:cNvCxnSpPr>
+          <p:nvPr/>
+        </p:nvCxnSpPr>
+        <p:spPr>
+          <a:xfrm>
+            <a:off x="9402704" y="465201"/>
+            <a:ext cx="344203" cy="495163"/>
+          </a:xfrm>
+          <a:prstGeom prst="line">
+            <a:avLst/>
+          </a:prstGeom>
+        </p:spPr>
+        <p:style>
+          <a:lnRef idx="3">
+            <a:schemeClr val="dk1"/>
+          </a:lnRef>
+          <a:fillRef idx="0">
+            <a:schemeClr val="dk1"/>
+          </a:fillRef>
+          <a:effectRef idx="2">
+            <a:schemeClr val="dk1"/>
+          </a:effectRef>
+          <a:fontRef idx="minor">
+            <a:schemeClr val="tx1"/>
+          </a:fontRef>
+        </p:style>
+      </p:cxnSp>
+      <p:cxnSp>
+        <p:nvCxnSpPr>
+          <p:cNvPr id="52" name="Connecteur droit 51">
+            <a:extLst>
+              <a:ext uri="{FF2B5EF4-FFF2-40B4-BE49-F238E27FC236}">
+                <a16:creationId xmlns:a16="http://schemas.microsoft.com/office/drawing/2014/main" id="{FA310BC7-694B-4984-99A2-61A1F4F6EBF9}"/>
+              </a:ext>
+            </a:extLst>
+          </p:cNvPr>
+          <p:cNvCxnSpPr>
+            <a:cxnSpLocks/>
+          </p:cNvCxnSpPr>
+          <p:nvPr/>
+        </p:nvCxnSpPr>
+        <p:spPr>
+          <a:xfrm flipH="1">
+            <a:off x="11370469" y="448308"/>
+            <a:ext cx="364332" cy="501657"/>
+          </a:xfrm>
+          <a:prstGeom prst="line">
+            <a:avLst/>
+          </a:prstGeom>
+        </p:spPr>
+        <p:style>
+          <a:lnRef idx="3">
+            <a:schemeClr val="dk1"/>
+          </a:lnRef>
+          <a:fillRef idx="0">
+            <a:schemeClr val="dk1"/>
+          </a:fillRef>
+          <a:effectRef idx="2">
+            <a:schemeClr val="dk1"/>
+          </a:effectRef>
+          <a:fontRef idx="minor">
+            <a:schemeClr val="tx1"/>
+          </a:fontRef>
+        </p:style>
+      </p:cxnSp>
+      <p:cxnSp>
+        <p:nvCxnSpPr>
+          <p:cNvPr id="53" name="Connecteur droit 52">
+            <a:extLst>
+              <a:ext uri="{FF2B5EF4-FFF2-40B4-BE49-F238E27FC236}">
+                <a16:creationId xmlns:a16="http://schemas.microsoft.com/office/drawing/2014/main" id="{BE0649BD-EE59-4DDA-960F-95B2572F9F13}"/>
+              </a:ext>
+            </a:extLst>
+          </p:cNvPr>
+          <p:cNvCxnSpPr>
+            <a:cxnSpLocks/>
+          </p:cNvCxnSpPr>
+          <p:nvPr/>
+        </p:nvCxnSpPr>
+        <p:spPr>
+          <a:xfrm>
+            <a:off x="9743203" y="949965"/>
+            <a:ext cx="1627266" cy="0"/>
+          </a:xfrm>
+          <a:prstGeom prst="line">
+            <a:avLst/>
+          </a:prstGeom>
+        </p:spPr>
+        <p:style>
+          <a:lnRef idx="3">
+            <a:schemeClr val="dk1"/>
+          </a:lnRef>
+          <a:fillRef idx="0">
+            <a:schemeClr val="dk1"/>
+          </a:fillRef>
+          <a:effectRef idx="2">
+            <a:schemeClr val="dk1"/>
+          </a:effectRef>
+          <a:fontRef idx="minor">
+            <a:schemeClr val="tx1"/>
+          </a:fontRef>
+        </p:style>
+      </p:cxnSp>
+      <p:cxnSp>
+        <p:nvCxnSpPr>
+          <p:cNvPr id="55" name="Connecteur droit 54">
+            <a:extLst>
+              <a:ext uri="{FF2B5EF4-FFF2-40B4-BE49-F238E27FC236}">
+                <a16:creationId xmlns:a16="http://schemas.microsoft.com/office/drawing/2014/main" id="{52AA9200-DAFA-4EEF-AC13-4C7CE82A59EC}"/>
+              </a:ext>
+            </a:extLst>
+          </p:cNvPr>
+          <p:cNvCxnSpPr>
+            <a:cxnSpLocks/>
+          </p:cNvCxnSpPr>
+          <p:nvPr/>
+        </p:nvCxnSpPr>
+        <p:spPr>
+          <a:xfrm>
+            <a:off x="11715750" y="454801"/>
+            <a:ext cx="476249" cy="10400"/>
+          </a:xfrm>
+          <a:prstGeom prst="line">
+            <a:avLst/>
+          </a:prstGeom>
+        </p:spPr>
+        <p:style>
+          <a:lnRef idx="3">
+            <a:schemeClr val="dk1"/>
+          </a:lnRef>
+          <a:fillRef idx="0">
+            <a:schemeClr val="dk1"/>
+          </a:fillRef>
+          <a:effectRef idx="2">
+            <a:schemeClr val="dk1"/>
+          </a:effectRef>
+          <a:fontRef idx="minor">
+            <a:schemeClr val="tx1"/>
+          </a:fontRef>
+        </p:style>
+      </p:cxnSp>
+      <p:cxnSp>
+        <p:nvCxnSpPr>
+          <p:cNvPr id="23" name="Connecteur droit 22">
+            <a:extLst>
+              <a:ext uri="{FF2B5EF4-FFF2-40B4-BE49-F238E27FC236}">
+                <a16:creationId xmlns:a16="http://schemas.microsoft.com/office/drawing/2014/main" id="{BCB092C8-0080-4E56-957E-0046D4C83988}"/>
+              </a:ext>
+            </a:extLst>
+          </p:cNvPr>
+          <p:cNvCxnSpPr>
+            <a:cxnSpLocks/>
+          </p:cNvCxnSpPr>
+          <p:nvPr/>
+        </p:nvCxnSpPr>
+        <p:spPr>
+          <a:xfrm flipH="1">
+            <a:off x="2216372" y="446356"/>
+            <a:ext cx="364332" cy="501657"/>
+          </a:xfrm>
+          <a:prstGeom prst="line">
+            <a:avLst/>
+          </a:prstGeom>
+        </p:spPr>
+        <p:style>
+          <a:lnRef idx="3">
+            <a:schemeClr val="dk1"/>
+          </a:lnRef>
+          <a:fillRef idx="0">
+            <a:schemeClr val="dk1"/>
+          </a:fillRef>
+          <a:effectRef idx="2">
+            <a:schemeClr val="dk1"/>
+          </a:effectRef>
+          <a:fontRef idx="minor">
+            <a:schemeClr val="tx1"/>
+          </a:fontRef>
+        </p:style>
+      </p:cxnSp>
+      <p:pic>
+        <p:nvPicPr>
+          <p:cNvPr id="2" name="Image 1">
+            <a:extLst>
+              <a:ext uri="{FF2B5EF4-FFF2-40B4-BE49-F238E27FC236}">
+                <a16:creationId xmlns:a16="http://schemas.microsoft.com/office/drawing/2014/main" id="{3689719D-30A8-4A64-BA60-84C605A6AA1F}"/>
+              </a:ext>
+            </a:extLst>
+          </p:cNvPr>
+          <p:cNvPicPr>
+            <a:picLocks noChangeAspect="1"/>
+          </p:cNvPicPr>
+          <p:nvPr/>
+        </p:nvPicPr>
+        <p:blipFill>
+          <a:blip r:embed="rId4"/>
+          <a:stretch>
+            <a:fillRect/>
+          </a:stretch>
+        </p:blipFill>
+        <p:spPr>
+          <a:xfrm>
+            <a:off x="1767913" y="1767187"/>
+            <a:ext cx="8440091" cy="4679940"/>
+          </a:xfrm>
+          <a:prstGeom prst="rect">
+            <a:avLst/>
+          </a:prstGeom>
+        </p:spPr>
+      </p:pic>
+      <p:sp>
+        <p:nvSpPr>
+          <p:cNvPr id="3" name="ZoneTexte 2">
+            <a:extLst>
+              <a:ext uri="{FF2B5EF4-FFF2-40B4-BE49-F238E27FC236}">
+                <a16:creationId xmlns:a16="http://schemas.microsoft.com/office/drawing/2014/main" id="{B42B6033-DEE7-42EF-A187-7349D8040779}"/>
+              </a:ext>
+            </a:extLst>
+          </p:cNvPr>
+          <p:cNvSpPr txBox="1"/>
+          <p:nvPr/>
+        </p:nvSpPr>
+        <p:spPr>
+          <a:xfrm>
+            <a:off x="2529946" y="855741"/>
+            <a:ext cx="6916027" cy="769441"/>
+          </a:xfrm>
+          <a:prstGeom prst="rect">
+            <a:avLst/>
+          </a:prstGeom>
+          <a:noFill/>
+        </p:spPr>
+        <p:txBody>
+          <a:bodyPr wrap="square" rtlCol="0">
+            <a:spAutoFit/>
+          </a:bodyPr>
+          <a:lstStyle/>
+          <a:p>
+            <a:pPr algn="ctr"/>
+            <a:r>
+              <a:rPr lang="fr-FR" sz="4400" dirty="0">
+                <a:latin typeface="Berlin Sans FB" panose="020E0602020502020306" pitchFamily="34" charset="0"/>
+              </a:rPr>
+              <a:t>Diagramme de séquence</a:t>
+            </a:r>
+          </a:p>
+        </p:txBody>
+      </p:sp>
+    </p:spTree>
+    <p:extLst>
+      <p:ext uri="{BB962C8B-B14F-4D97-AF65-F5344CB8AC3E}">
+        <p14:creationId xmlns:p14="http://schemas.microsoft.com/office/powerpoint/2010/main" val="1212816885"/>
+      </p:ext>
+    </p:extLst>
+  </p:cSld>
+  <p:clrMapOvr>
+    <a:masterClrMapping/>
+  </p:clrMapOvr>
+  <mc:AlternateContent xmlns:mc="http://schemas.openxmlformats.org/markup-compatibility/2006">
+    <mc:Choice xmlns:p14="http://schemas.microsoft.com/office/powerpoint/2010/main" Requires="p14">
+      <p:transition spd="slow">
+        <p14:reveal/>
+      </p:transition>
+    </mc:Choice>
+    <mc:Fallback>
+      <p:transition spd="slow">
+        <p:fade/>
+      </p:transition>
+    </mc:Fallback>
+  </mc:AlternateContent>
+</p:sld>
+</file>
+
+<file path=ppt/slides/slide6.xml><?xml version="1.0" encoding="utf-8"?>
+<p:sld xmlns:a="http://schemas.openxmlformats.org/drawingml/2006/main" xmlns:r="http://schemas.openxmlformats.org/officeDocument/2006/relationships" xmlns:p="http://schemas.openxmlformats.org/presentationml/2006/main">
+  <p:cSld>
+    <p:spTree>
+      <p:nvGrpSpPr>
+        <p:cNvPr id="1" name=""/>
+        <p:cNvGrpSpPr/>
+        <p:nvPr/>
+      </p:nvGrpSpPr>
+      <p:grpSpPr>
+        <a:xfrm>
+          <a:off x="0" y="0"/>
+          <a:ext cx="0" cy="0"/>
+          <a:chOff x="0" y="0"/>
+          <a:chExt cx="0" cy="0"/>
+        </a:xfrm>
+      </p:grpSpPr>
+    </p:spTree>
+    <p:extLst>
+      <p:ext uri="{BB962C8B-B14F-4D97-AF65-F5344CB8AC3E}">
+        <p14:creationId xmlns:p14="http://schemas.microsoft.com/office/powerpoint/2010/main" val="19465528"/>
       </p:ext>
     </p:extLst>
   </p:cSld>

</xml_diff>